<commit_message>
template atualizado com qrcode mas sem orçamento
</commit_message>
<xml_diff>
--- a/Documentações/Template para Pôster - Startup one.pptx
+++ b/Documentações/Template para Pôster - Startup one.pptx
@@ -1218,8 +1218,8 @@
         </p:nvSpPr>
         <p:spPr>
           <a:xfrm>
-            <a:off x="11201876" y="13170065"/>
-            <a:ext cx="4536872" cy="2246769"/>
+            <a:off x="11125042" y="14889779"/>
+            <a:ext cx="4536872" cy="784830"/>
           </a:xfrm>
           <a:prstGeom prst="rect">
             <a:avLst/>
@@ -1253,7 +1253,7 @@
           <a:p>
             <a:pPr algn="just"/>
             <a:r>
-              <a:rPr lang="pt-BR" sz="2800" dirty="0">
+              <a:rPr lang="pt-BR" sz="1500" dirty="0">
                 <a:solidFill>
                   <a:schemeClr val="tx1"/>
                 </a:solidFill>
@@ -1484,7 +1484,7 @@
                 <a:latin typeface="Arial"/>
                 <a:cs typeface="Arial"/>
               </a:rPr>
-              <a:t>ODS do projeto: 8 - Trabalho Decente e Crescimento Econômico; 9 - Indústria, Inovação e Infraestrutura; 11 - Cidades e Comunidades Sustentáveis; e 17 - Parcerias e Meios de Implementação.</a:t>
+              <a:t>ODS do Projeto: 8 - Trabalho Decente e Crescimento Econômico; 9 - Indústria, Inovação e Infraestrutura; 11 - Cidades e Comunidades Sustentáveis; e 17 - Parcerias e Meios de Implementação.</a:t>
             </a:r>
             <a:endParaRPr lang="pt-BR" sz="2100" dirty="0">
               <a:latin typeface="Arial"/>
@@ -1743,7 +1743,7 @@
         <p:spPr>
           <a:xfrm>
             <a:off x="11067481" y="9483710"/>
-            <a:ext cx="9760123" cy="2962513"/>
+            <a:ext cx="9760123" cy="868323"/>
           </a:xfrm>
           <a:prstGeom prst="roundRect">
             <a:avLst/>
@@ -1776,7 +1776,7 @@
           <a:p>
             <a:pPr algn="just"/>
             <a:r>
-              <a:rPr lang="pt-BR" sz="2800" dirty="0">
+              <a:rPr lang="pt-BR" sz="1500" dirty="0">
                 <a:solidFill>
                   <a:schemeClr val="tx1"/>
                 </a:solidFill>
@@ -1848,8 +1848,8 @@
         </p:nvSpPr>
         <p:spPr>
           <a:xfrm>
-            <a:off x="15919849" y="12962384"/>
-            <a:ext cx="4618899" cy="3046988"/>
+            <a:off x="15947542" y="14793667"/>
+            <a:ext cx="4618899" cy="784830"/>
           </a:xfrm>
           <a:prstGeom prst="rect">
             <a:avLst/>
@@ -1883,7 +1883,7 @@
           <a:p>
             <a:pPr algn="just"/>
             <a:r>
-              <a:rPr lang="pt-BR" sz="2800" dirty="0">
+              <a:rPr lang="pt-BR" sz="1500" dirty="0">
                 <a:solidFill>
                   <a:schemeClr val="tx1"/>
                 </a:solidFill>
@@ -2024,7 +2024,7 @@
         <p:spPr>
           <a:xfrm>
             <a:off x="11031006" y="17755100"/>
-            <a:ext cx="9862461" cy="1532334"/>
+            <a:ext cx="9862461" cy="612934"/>
           </a:xfrm>
           <a:prstGeom prst="roundRect">
             <a:avLst/>
@@ -2069,7 +2069,7 @@
           </a:lstStyle>
           <a:p>
             <a:r>
-              <a:rPr lang="pt-BR" sz="2800" dirty="0"/>
+              <a:rPr lang="pt-BR" sz="1500" dirty="0"/>
               <a:t>Resuma os principais resultados do projeto, destacando o que foi alcançado e como isso se relaciona com os objetivos iniciais.</a:t>
             </a:r>
           </a:p>
@@ -2143,7 +2143,7 @@
         <p:spPr>
           <a:xfrm>
             <a:off x="11070630" y="21914632"/>
-            <a:ext cx="9772510" cy="1055608"/>
+            <a:ext cx="9772510" cy="612934"/>
           </a:xfrm>
           <a:prstGeom prst="roundRect">
             <a:avLst/>
@@ -2188,7 +2188,7 @@
           </a:lstStyle>
           <a:p>
             <a:r>
-              <a:rPr lang="pt-BR" sz="2800" dirty="0"/>
+              <a:rPr lang="pt-BR" sz="1500" dirty="0"/>
               <a:t>Sugira possíveis melhorias ou expansões para o projeto no futuro, considerando limitações e novas oportunidades.</a:t>
             </a:r>
           </a:p>
@@ -2262,7 +2262,7 @@
         <p:spPr>
           <a:xfrm>
             <a:off x="11201876" y="25938802"/>
-            <a:ext cx="9733444" cy="1055608"/>
+            <a:ext cx="9733444" cy="817245"/>
           </a:xfrm>
           <a:prstGeom prst="roundRect">
             <a:avLst/>
@@ -2295,14 +2295,14 @@
           <a:p>
             <a:pPr algn="just"/>
             <a:r>
-              <a:rPr lang="pt-BR" sz="2800" dirty="0">
+              <a:rPr lang="pt-BR" sz="2100" dirty="0">
                 <a:solidFill>
                   <a:schemeClr val="tx1"/>
                 </a:solidFill>
                 <a:latin typeface="Arial" panose="020B0604020202020204" pitchFamily="34" charset="0"/>
                 <a:cs typeface="Arial" panose="020B0604020202020204" pitchFamily="34" charset="0"/>
               </a:rPr>
-              <a:t>Agradeçam aos professores, parceiros e ao mentor pelo suporte essencial ao sucesso do projeto.</a:t>
+              <a:t>Gostaríamos de agradecer aos nossos professores, parceiros e ao nosso mentor pelo suporte essencial ao sucesso do projeto.</a:t>
             </a:r>
           </a:p>
         </p:txBody>
@@ -2758,10 +2758,10 @@
       </p:pic>
       <p:pic>
         <p:nvPicPr>
-          <p:cNvPr id="21" name="Imagem 20" descr="Texto&#10;&#10;Descrição gerada automaticamente com confiança média">
-            <a:extLst>
-              <a:ext uri="{FF2B5EF4-FFF2-40B4-BE49-F238E27FC236}">
-                <a16:creationId xmlns:a16="http://schemas.microsoft.com/office/drawing/2014/main" id="{DA3916EA-EC8A-FB87-4123-FF2DA06F82BA}"/>
+          <p:cNvPr id="20" name="Imagem 19">
+            <a:extLst>
+              <a:ext uri="{FF2B5EF4-FFF2-40B4-BE49-F238E27FC236}">
+                <a16:creationId xmlns:a16="http://schemas.microsoft.com/office/drawing/2014/main" id="{E35F3B64-023A-2CEE-7F1D-DB906958643E}"/>
               </a:ext>
             </a:extLst>
           </p:cNvPr>
@@ -2778,227 +2778,26 @@
               </a:ext>
             </a:extLst>
           </a:blip>
-          <a:srcRect l="31810" t="28707" r="28343" b="31357"/>
-          <a:stretch/>
+          <a:stretch>
+            <a:fillRect/>
+          </a:stretch>
         </p:blipFill>
         <p:spPr>
           <a:xfrm>
-            <a:off x="18963605" y="28140765"/>
-            <a:ext cx="1993953" cy="1998418"/>
+            <a:off x="1311210" y="12919093"/>
+            <a:ext cx="8016406" cy="3871440"/>
           </a:xfrm>
           <a:prstGeom prst="rect">
             <a:avLst/>
           </a:prstGeom>
         </p:spPr>
       </p:pic>
-      <p:sp>
-        <p:nvSpPr>
-          <p:cNvPr id="10" name="CaixaDeTexto 9">
-            <a:extLst>
-              <a:ext uri="{FF2B5EF4-FFF2-40B4-BE49-F238E27FC236}">
-                <a16:creationId xmlns:a16="http://schemas.microsoft.com/office/drawing/2014/main" id="{BBD028C8-E521-FFFE-0D3F-51F9D871F7F6}"/>
-              </a:ext>
-            </a:extLst>
-          </p:cNvPr>
-          <p:cNvSpPr txBox="1"/>
-          <p:nvPr/>
-        </p:nvSpPr>
-        <p:spPr>
-          <a:xfrm>
-            <a:off x="11510047" y="27103495"/>
-            <a:ext cx="7055067" cy="1191816"/>
-          </a:xfrm>
-          <a:prstGeom prst="roundRect">
-            <a:avLst/>
-          </a:prstGeom>
-          <a:ln>
-            <a:solidFill>
-              <a:schemeClr val="bg1"/>
-            </a:solidFill>
-          </a:ln>
-        </p:spPr>
-        <p:style>
-          <a:lnRef idx="2">
-            <a:schemeClr val="accent1"/>
-          </a:lnRef>
-          <a:fillRef idx="1">
-            <a:schemeClr val="lt1"/>
-          </a:fillRef>
-          <a:effectRef idx="0">
-            <a:schemeClr val="accent1"/>
-          </a:effectRef>
-          <a:fontRef idx="minor">
-            <a:schemeClr val="dk1"/>
-          </a:fontRef>
-        </p:style>
-        <p:txBody>
-          <a:bodyPr wrap="square" rtlCol="0">
-            <a:spAutoFit/>
-          </a:bodyPr>
-          <a:lstStyle/>
-          <a:p>
-            <a:pPr algn="just"/>
-            <a:r>
-              <a:rPr lang="pt-BR" sz="1800" b="1" dirty="0">
-                <a:solidFill>
-                  <a:schemeClr val="tx1"/>
-                </a:solidFill>
-                <a:highlight>
-                  <a:srgbClr val="C0C0C0"/>
-                </a:highlight>
-                <a:latin typeface="Arial" panose="020B0604020202020204" pitchFamily="34" charset="0"/>
-                <a:cs typeface="Arial" panose="020B0604020202020204" pitchFamily="34" charset="0"/>
-              </a:rPr>
-              <a:t>QR Codes: </a:t>
-            </a:r>
-            <a:r>
-              <a:rPr lang="pt-BR" sz="1400" dirty="0">
-                <a:solidFill>
-                  <a:schemeClr val="tx1"/>
-                </a:solidFill>
-                <a:highlight>
-                  <a:srgbClr val="C0C0C0"/>
-                </a:highlight>
-                <a:latin typeface="Arial" panose="020B0604020202020204" pitchFamily="34" charset="0"/>
-                <a:cs typeface="Arial" panose="020B0604020202020204" pitchFamily="34" charset="0"/>
-              </a:rPr>
-              <a:t>Incluam no final do banner QR Codes para os seguintes links: </a:t>
-            </a:r>
-            <a:r>
-              <a:rPr lang="pt-BR" sz="1400" dirty="0" err="1">
-                <a:solidFill>
-                  <a:schemeClr val="tx1"/>
-                </a:solidFill>
-                <a:highlight>
-                  <a:srgbClr val="C0C0C0"/>
-                </a:highlight>
-                <a:latin typeface="Arial" panose="020B0604020202020204" pitchFamily="34" charset="0"/>
-                <a:cs typeface="Arial" panose="020B0604020202020204" pitchFamily="34" charset="0"/>
-              </a:rPr>
-              <a:t>Figma</a:t>
-            </a:r>
-            <a:r>
-              <a:rPr lang="pt-BR" sz="1400" dirty="0">
-                <a:solidFill>
-                  <a:schemeClr val="tx1"/>
-                </a:solidFill>
-                <a:highlight>
-                  <a:srgbClr val="C0C0C0"/>
-                </a:highlight>
-                <a:latin typeface="Arial" panose="020B0604020202020204" pitchFamily="34" charset="0"/>
-                <a:cs typeface="Arial" panose="020B0604020202020204" pitchFamily="34" charset="0"/>
-              </a:rPr>
-              <a:t> (protótipos), Landing Page (apresentação do projeto), GitHub (código-fonte) e </a:t>
-            </a:r>
-            <a:r>
-              <a:rPr lang="pt-BR" sz="1400" dirty="0" err="1">
-                <a:solidFill>
-                  <a:schemeClr val="tx1"/>
-                </a:solidFill>
-                <a:highlight>
-                  <a:srgbClr val="C0C0C0"/>
-                </a:highlight>
-                <a:latin typeface="Arial" panose="020B0604020202020204" pitchFamily="34" charset="0"/>
-                <a:cs typeface="Arial" panose="020B0604020202020204" pitchFamily="34" charset="0"/>
-              </a:rPr>
-              <a:t>Trello</a:t>
-            </a:r>
-            <a:r>
-              <a:rPr lang="pt-BR" sz="1400" dirty="0">
-                <a:solidFill>
-                  <a:schemeClr val="tx1"/>
-                </a:solidFill>
-                <a:highlight>
-                  <a:srgbClr val="C0C0C0"/>
-                </a:highlight>
-                <a:latin typeface="Arial" panose="020B0604020202020204" pitchFamily="34" charset="0"/>
-                <a:cs typeface="Arial" panose="020B0604020202020204" pitchFamily="34" charset="0"/>
-              </a:rPr>
-              <a:t> (gestão do projeto). Verifiquem se os QR Codes estão funcionais e posicionados de forma clara</a:t>
-            </a:r>
-            <a:r>
-              <a:rPr lang="pt-BR" sz="1800" dirty="0">
-                <a:solidFill>
-                  <a:schemeClr val="tx1"/>
-                </a:solidFill>
-                <a:highlight>
-                  <a:srgbClr val="C0C0C0"/>
-                </a:highlight>
-                <a:latin typeface="Arial" panose="020B0604020202020204" pitchFamily="34" charset="0"/>
-                <a:cs typeface="Arial" panose="020B0604020202020204" pitchFamily="34" charset="0"/>
-              </a:rPr>
-              <a:t>. </a:t>
-            </a:r>
-            <a:r>
-              <a:rPr lang="pt-BR" sz="1800" dirty="0">
-                <a:solidFill>
-                  <a:srgbClr val="FF0000"/>
-                </a:solidFill>
-                <a:highlight>
-                  <a:srgbClr val="C0C0C0"/>
-                </a:highlight>
-                <a:latin typeface="Arial" panose="020B0604020202020204" pitchFamily="34" charset="0"/>
-                <a:cs typeface="Arial" panose="020B0604020202020204" pitchFamily="34" charset="0"/>
-              </a:rPr>
-              <a:t>APAGUE ESSE TEXTO</a:t>
-            </a:r>
-          </a:p>
-        </p:txBody>
-      </p:sp>
-      <p:cxnSp>
-        <p:nvCxnSpPr>
-          <p:cNvPr id="13" name="Conector: Angulado 12">
-            <a:extLst>
-              <a:ext uri="{FF2B5EF4-FFF2-40B4-BE49-F238E27FC236}">
-                <a16:creationId xmlns:a16="http://schemas.microsoft.com/office/drawing/2014/main" id="{76033B62-905D-9496-CCAD-FA650A4FCA83}"/>
-              </a:ext>
-            </a:extLst>
-          </p:cNvPr>
-          <p:cNvCxnSpPr>
-            <a:cxnSpLocks/>
-            <a:endCxn id="21" idx="0"/>
-          </p:cNvCxnSpPr>
-          <p:nvPr/>
-        </p:nvCxnSpPr>
-        <p:spPr>
-          <a:xfrm>
-            <a:off x="18588941" y="27408851"/>
-            <a:ext cx="1371641" cy="731914"/>
-          </a:xfrm>
-          <a:prstGeom prst="bentConnector2">
-            <a:avLst/>
-          </a:prstGeom>
-          <a:ln w="19050" cap="flat" cmpd="sng" algn="ctr">
-            <a:solidFill>
-              <a:srgbClr val="FF0000"/>
-            </a:solidFill>
-            <a:prstDash val="solid"/>
-            <a:round/>
-            <a:headEnd type="none" w="med" len="med"/>
-            <a:tailEnd type="arrow" w="med" len="med"/>
-          </a:ln>
-        </p:spPr>
-        <p:style>
-          <a:lnRef idx="0">
-            <a:scrgbClr r="0" g="0" b="0"/>
-          </a:lnRef>
-          <a:fillRef idx="0">
-            <a:scrgbClr r="0" g="0" b="0"/>
-          </a:fillRef>
-          <a:effectRef idx="0">
-            <a:scrgbClr r="0" g="0" b="0"/>
-          </a:effectRef>
-          <a:fontRef idx="minor">
-            <a:schemeClr val="tx1"/>
-          </a:fontRef>
-        </p:style>
-      </p:cxnSp>
       <p:pic>
         <p:nvPicPr>
-          <p:cNvPr id="20" name="Imagem 19">
-            <a:extLst>
-              <a:ext uri="{FF2B5EF4-FFF2-40B4-BE49-F238E27FC236}">
-                <a16:creationId xmlns:a16="http://schemas.microsoft.com/office/drawing/2014/main" id="{E35F3B64-023A-2CEE-7F1D-DB906958643E}"/>
+          <p:cNvPr id="15" name="Imagem 14">
+            <a:extLst>
+              <a:ext uri="{FF2B5EF4-FFF2-40B4-BE49-F238E27FC236}">
+                <a16:creationId xmlns:a16="http://schemas.microsoft.com/office/drawing/2014/main" id="{8905CD64-1FE6-10A6-5115-254E8E025E5C}"/>
               </a:ext>
             </a:extLst>
           </p:cNvPr>
@@ -3008,7 +2807,7 @@
           <p:nvPr/>
         </p:nvPicPr>
         <p:blipFill>
-          <a:blip r:embed="rId5">
+          <a:blip r:embed="rId5" cstate="print">
             <a:extLst>
               <a:ext uri="{28A0092B-C50C-407E-A947-70E740481C1C}">
                 <a14:useLocalDpi xmlns:a14="http://schemas.microsoft.com/office/drawing/2010/main" val="0"/>
@@ -3021,8 +2820,8 @@
         </p:blipFill>
         <p:spPr>
           <a:xfrm>
-            <a:off x="1311210" y="12919093"/>
-            <a:ext cx="8016406" cy="3871440"/>
+            <a:off x="18547565" y="26735248"/>
+            <a:ext cx="1615050" cy="1615050"/>
           </a:xfrm>
           <a:prstGeom prst="rect">
             <a:avLst/>
@@ -3313,6 +3112,14 @@
 </file>
 
 <file path=customXml/item2.xml><?xml version="1.0" encoding="utf-8"?>
+<p:properties xmlns:p="http://schemas.microsoft.com/office/2006/metadata/properties" xmlns:xsi="http://www.w3.org/2001/XMLSchema-instance" xmlns:pc="http://schemas.microsoft.com/office/infopath/2007/PartnerControls">
+  <documentManagement>
+    <_activity xmlns="ff6ad67d-1b1d-4c73-9dd4-98a4fbcad5a6" xsi:nil="true"/>
+  </documentManagement>
+</p:properties>
+</file>
+
+<file path=customXml/item3.xml><?xml version="1.0" encoding="utf-8"?>
 <ct:contentTypeSchema xmlns:ct="http://schemas.microsoft.com/office/2006/metadata/contentType" xmlns:ma="http://schemas.microsoft.com/office/2006/metadata/properties/metaAttributes" ct:_="" ma:_="" ma:contentTypeName="Documento" ma:contentTypeID="0x0101009A894B47E77362449B3110FE52FC1761" ma:contentTypeVersion="16" ma:contentTypeDescription="Crie um novo documento." ma:contentTypeScope="" ma:versionID="a174adf514af0ec3b9bd0eb9e1c0e71e">
   <xsd:schema xmlns:xsd="http://www.w3.org/2001/XMLSchema" xmlns:xs="http://www.w3.org/2001/XMLSchema" xmlns:p="http://schemas.microsoft.com/office/2006/metadata/properties" xmlns:ns3="a3014d1d-f2cc-4095-a524-fddffbc006f1" xmlns:ns4="ff6ad67d-1b1d-4c73-9dd4-98a4fbcad5a6" targetNamespace="http://schemas.microsoft.com/office/2006/metadata/properties" ma:root="true" ma:fieldsID="6ce6fbd86bcd44befd99bda8c56c7cb1" ns3:_="" ns4:_="">
     <xsd:import namespace="a3014d1d-f2cc-4095-a524-fddffbc006f1"/>
@@ -3553,14 +3360,6 @@
 </ct:contentTypeSchema>
 </file>
 
-<file path=customXml/item3.xml><?xml version="1.0" encoding="utf-8"?>
-<p:properties xmlns:p="http://schemas.microsoft.com/office/2006/metadata/properties" xmlns:xsi="http://www.w3.org/2001/XMLSchema-instance" xmlns:pc="http://schemas.microsoft.com/office/infopath/2007/PartnerControls">
-  <documentManagement>
-    <_activity xmlns="ff6ad67d-1b1d-4c73-9dd4-98a4fbcad5a6" xsi:nil="true"/>
-  </documentManagement>
-</p:properties>
-</file>
-
 <file path=customXml/itemProps1.xml><?xml version="1.0" encoding="utf-8"?>
 <ds:datastoreItem xmlns:ds="http://schemas.openxmlformats.org/officeDocument/2006/customXml" ds:itemID="{5BC455D9-37CD-46E7-8021-8644E5D67886}">
   <ds:schemaRefs>
@@ -3570,6 +3369,23 @@
 </file>
 
 <file path=customXml/itemProps2.xml><?xml version="1.0" encoding="utf-8"?>
+<ds:datastoreItem xmlns:ds="http://schemas.openxmlformats.org/officeDocument/2006/customXml" ds:itemID="{0F738E70-B1B1-4A3C-BB3D-3799789DDC9A}">
+  <ds:schemaRefs>
+    <ds:schemaRef ds:uri="a3014d1d-f2cc-4095-a524-fddffbc006f1"/>
+    <ds:schemaRef ds:uri="ff6ad67d-1b1d-4c73-9dd4-98a4fbcad5a6"/>
+    <ds:schemaRef ds:uri="http://purl.org/dc/dcmitype/"/>
+    <ds:schemaRef ds:uri="http://purl.org/dc/elements/1.1/"/>
+    <ds:schemaRef ds:uri="http://purl.org/dc/terms/"/>
+    <ds:schemaRef ds:uri="http://schemas.microsoft.com/office/2006/documentManagement/types"/>
+    <ds:schemaRef ds:uri="http://schemas.microsoft.com/office/2006/metadata/properties"/>
+    <ds:schemaRef ds:uri="http://schemas.microsoft.com/office/infopath/2007/PartnerControls"/>
+    <ds:schemaRef ds:uri="http://schemas.openxmlformats.org/package/2006/metadata/core-properties"/>
+    <ds:schemaRef ds:uri="http://www.w3.org/XML/1998/namespace"/>
+  </ds:schemaRefs>
+</ds:datastoreItem>
+</file>
+
+<file path=customXml/itemProps3.xml><?xml version="1.0" encoding="utf-8"?>
 <ds:datastoreItem xmlns:ds="http://schemas.openxmlformats.org/officeDocument/2006/customXml" ds:itemID="{BDF6B089-4EFF-41B7-9EC4-20E73BF0D62B}">
   <ds:schemaRefs>
     <ds:schemaRef ds:uri="a3014d1d-f2cc-4095-a524-fddffbc006f1"/>
@@ -3586,21 +3402,4 @@
     <ds:schemaRef ds:uri="http://www.w3.org/2001/XMLSchema"/>
   </ds:schemaRefs>
 </ds:datastoreItem>
-</file>
-
-<file path=customXml/itemProps3.xml><?xml version="1.0" encoding="utf-8"?>
-<ds:datastoreItem xmlns:ds="http://schemas.openxmlformats.org/officeDocument/2006/customXml" ds:itemID="{0F738E70-B1B1-4A3C-BB3D-3799789DDC9A}">
-  <ds:schemaRefs>
-    <ds:schemaRef ds:uri="a3014d1d-f2cc-4095-a524-fddffbc006f1"/>
-    <ds:schemaRef ds:uri="ff6ad67d-1b1d-4c73-9dd4-98a4fbcad5a6"/>
-    <ds:schemaRef ds:uri="http://purl.org/dc/dcmitype/"/>
-    <ds:schemaRef ds:uri="http://purl.org/dc/elements/1.1/"/>
-    <ds:schemaRef ds:uri="http://purl.org/dc/terms/"/>
-    <ds:schemaRef ds:uri="http://schemas.microsoft.com/office/2006/documentManagement/types"/>
-    <ds:schemaRef ds:uri="http://schemas.microsoft.com/office/2006/metadata/properties"/>
-    <ds:schemaRef ds:uri="http://schemas.microsoft.com/office/infopath/2007/PartnerControls"/>
-    <ds:schemaRef ds:uri="http://schemas.openxmlformats.org/package/2006/metadata/core-properties"/>
-    <ds:schemaRef ds:uri="http://www.w3.org/XML/1998/namespace"/>
-  </ds:schemaRefs>
-</ds:datastoreItem>
 </file>
</xml_diff>